<commit_message>
Präsentation für Mittwoch geupdated
</commit_message>
<xml_diff>
--- a/orga/PrasiSNEK.pptx
+++ b/orga/PrasiSNEK.pptx
@@ -10,9 +10,8 @@
     <p:sldId id="258" r:id="rId4"/>
     <p:sldId id="259" r:id="rId5"/>
     <p:sldId id="261" r:id="rId6"/>
-    <p:sldId id="262" r:id="rId7"/>
-    <p:sldId id="263" r:id="rId8"/>
-    <p:sldId id="264" r:id="rId9"/>
+    <p:sldId id="263" r:id="rId7"/>
+    <p:sldId id="264" r:id="rId8"/>
   </p:sldIdLst>
   <p:sldSz cx="12192000" cy="6858000"/>
   <p:notesSz cx="6858000" cy="9144000"/>
@@ -6064,12 +6063,8 @@
           <a:lstStyle/>
           <a:p>
             <a:r>
-              <a:rPr lang="de-DE" dirty="0" err="1"/>
-              <a:t>Organisations</a:t>
-            </a:r>
-            <a:r>
               <a:rPr lang="de-DE" dirty="0"/>
-              <a:t> Präsentation</a:t>
+              <a:t>Organisations-Präsentation</a:t>
             </a:r>
             <a:endParaRPr lang="en-US" dirty="0"/>
           </a:p>
@@ -6187,7 +6182,7 @@
             <a:pPr lvl="2"/>
             <a:r>
               <a:rPr lang="de-DE" dirty="0"/>
-              <a:t>Grobes Programmmodel</a:t>
+              <a:t>Grobes Programmmodell</a:t>
             </a:r>
           </a:p>
           <a:p>
@@ -6327,7 +6322,7 @@
           <a:p>
             <a:r>
               <a:rPr lang="de-DE" dirty="0"/>
-              <a:t>Verliert Länge wenn Item aufgehoben wird</a:t>
+              <a:t>Verliert Länge, wenn Item aufgehoben wird</a:t>
             </a:r>
           </a:p>
           <a:p>
@@ -6341,7 +6336,7 @@
             </a:r>
             <a:r>
               <a:rPr lang="de-DE" dirty="0"/>
-              <a:t> wenn altes aufgehoben wurde</a:t>
+              <a:t>, wenn altes aufgehoben wurde</a:t>
             </a:r>
           </a:p>
           <a:p>
@@ -6704,172 +6699,6 @@
           <p:cNvPr id="2" name="Titel 1">
             <a:extLst>
               <a:ext uri="{FF2B5EF4-FFF2-40B4-BE49-F238E27FC236}">
-                <a16:creationId xmlns:a16="http://schemas.microsoft.com/office/drawing/2014/main" id="{BBCF62C3-6BA4-4569-904A-ECC65F4876B0}"/>
-              </a:ext>
-            </a:extLst>
-          </p:cNvPr>
-          <p:cNvSpPr>
-            <a:spLocks noGrp="1"/>
-          </p:cNvSpPr>
-          <p:nvPr>
-            <p:ph type="title"/>
-          </p:nvPr>
-        </p:nvSpPr>
-        <p:spPr/>
-        <p:txBody>
-          <a:bodyPr/>
-          <a:lstStyle/>
-          <a:p>
-            <a:r>
-              <a:rPr lang="de-DE" dirty="0"/>
-              <a:t>Untergruppen</a:t>
-            </a:r>
-            <a:endParaRPr lang="en-US" dirty="0"/>
-          </a:p>
-        </p:txBody>
-      </p:sp>
-      <p:sp>
-        <p:nvSpPr>
-          <p:cNvPr id="4" name="Textfeld 3">
-            <a:extLst>
-              <a:ext uri="{FF2B5EF4-FFF2-40B4-BE49-F238E27FC236}">
-                <a16:creationId xmlns:a16="http://schemas.microsoft.com/office/drawing/2014/main" id="{00BE8D41-9F6F-4E54-884E-95703134894D}"/>
-              </a:ext>
-            </a:extLst>
-          </p:cNvPr>
-          <p:cNvSpPr txBox="1"/>
-          <p:nvPr/>
-        </p:nvSpPr>
-        <p:spPr>
-          <a:xfrm>
-            <a:off x="10595295" y="691318"/>
-            <a:ext cx="469784" cy="461665"/>
-          </a:xfrm>
-          <a:prstGeom prst="rect">
-            <a:avLst/>
-          </a:prstGeom>
-          <a:noFill/>
-        </p:spPr>
-        <p:txBody>
-          <a:bodyPr wrap="square" rtlCol="0">
-            <a:spAutoFit/>
-          </a:bodyPr>
-          <a:lstStyle/>
-          <a:p>
-            <a:r>
-              <a:rPr lang="de-DE" sz="2400" b="1" dirty="0"/>
-              <a:t>2</a:t>
-            </a:r>
-            <a:endParaRPr lang="en-US" sz="2400" b="1" dirty="0"/>
-          </a:p>
-        </p:txBody>
-      </p:sp>
-      <p:sp>
-        <p:nvSpPr>
-          <p:cNvPr id="8" name="Inhaltsplatzhalter 2">
-            <a:extLst>
-              <a:ext uri="{FF2B5EF4-FFF2-40B4-BE49-F238E27FC236}">
-                <a16:creationId xmlns:a16="http://schemas.microsoft.com/office/drawing/2014/main" id="{908ECA19-403D-4E29-9117-D136C9A3AC58}"/>
-              </a:ext>
-            </a:extLst>
-          </p:cNvPr>
-          <p:cNvSpPr>
-            <a:spLocks noGrp="1"/>
-          </p:cNvSpPr>
-          <p:nvPr>
-            <p:ph idx="1"/>
-          </p:nvPr>
-        </p:nvSpPr>
-        <p:spPr>
-          <a:xfrm>
-            <a:off x="1103312" y="2052918"/>
-            <a:ext cx="8946541" cy="4195481"/>
-          </a:xfrm>
-        </p:spPr>
-        <p:txBody>
-          <a:bodyPr/>
-          <a:lstStyle/>
-          <a:p>
-            <a:r>
-              <a:rPr lang="de-DE" dirty="0"/>
-              <a:t>Spezialgebiete der Untergruppen</a:t>
-            </a:r>
-          </a:p>
-          <a:p>
-            <a:pPr lvl="1"/>
-            <a:r>
-              <a:rPr lang="de-DE" dirty="0"/>
-              <a:t>Lisa | Marina – Canvas und Webseite</a:t>
-            </a:r>
-          </a:p>
-          <a:p>
-            <a:pPr lvl="1"/>
-            <a:r>
-              <a:rPr lang="de-DE" dirty="0"/>
-              <a:t>Lisa | Julian |</a:t>
-            </a:r>
-            <a:r>
-              <a:rPr lang="de-DE" dirty="0" err="1"/>
-              <a:t>Lule</a:t>
-            </a:r>
-            <a:r>
-              <a:rPr lang="de-DE" dirty="0"/>
-              <a:t> | Yasmin – Spielelogik</a:t>
-            </a:r>
-          </a:p>
-          <a:p>
-            <a:pPr lvl="1"/>
-            <a:r>
-              <a:rPr lang="de-DE" dirty="0"/>
-              <a:t>Yasmin | </a:t>
-            </a:r>
-            <a:r>
-              <a:rPr lang="de-DE" dirty="0" err="1"/>
-              <a:t>Lule</a:t>
-            </a:r>
-            <a:r>
-              <a:rPr lang="de-DE" dirty="0"/>
-              <a:t> - Dokumentation</a:t>
-            </a:r>
-            <a:endParaRPr lang="en-US" dirty="0"/>
-          </a:p>
-        </p:txBody>
-      </p:sp>
-    </p:spTree>
-    <p:extLst>
-      <p:ext uri="{BB962C8B-B14F-4D97-AF65-F5344CB8AC3E}">
-        <p14:creationId xmlns:p14="http://schemas.microsoft.com/office/powerpoint/2010/main" val="2078511532"/>
-      </p:ext>
-    </p:extLst>
-  </p:cSld>
-  <p:clrMapOvr>
-    <a:masterClrMapping/>
-  </p:clrMapOvr>
-</p:sld>
-</file>
-
-<file path=ppt/slides/slide7.xml><?xml version="1.0" encoding="utf-8"?>
-<p:sld xmlns:a="http://schemas.openxmlformats.org/drawingml/2006/main" xmlns:r="http://schemas.openxmlformats.org/officeDocument/2006/relationships" xmlns:p="http://schemas.openxmlformats.org/presentationml/2006/main">
-  <p:cSld>
-    <p:spTree>
-      <p:nvGrpSpPr>
-        <p:cNvPr id="1" name=""/>
-        <p:cNvGrpSpPr/>
-        <p:nvPr/>
-      </p:nvGrpSpPr>
-      <p:grpSpPr>
-        <a:xfrm>
-          <a:off x="0" y="0"/>
-          <a:ext cx="0" cy="0"/>
-          <a:chOff x="0" y="0"/>
-          <a:chExt cx="0" cy="0"/>
-        </a:xfrm>
-      </p:grpSpPr>
-      <p:sp>
-        <p:nvSpPr>
-          <p:cNvPr id="2" name="Titel 1">
-            <a:extLst>
-              <a:ext uri="{FF2B5EF4-FFF2-40B4-BE49-F238E27FC236}">
                 <a16:creationId xmlns:a16="http://schemas.microsoft.com/office/drawing/2014/main" id="{E7250210-6D3E-42A6-BE6F-2C64A995AEDE}"/>
               </a:ext>
             </a:extLst>
@@ -7089,7 +6918,7 @@
 </p:sld>
 </file>
 
-<file path=ppt/slides/slide8.xml><?xml version="1.0" encoding="utf-8"?>
+<file path=ppt/slides/slide7.xml><?xml version="1.0" encoding="utf-8"?>
 <p:sld xmlns:a="http://schemas.openxmlformats.org/drawingml/2006/main" xmlns:r="http://schemas.openxmlformats.org/officeDocument/2006/relationships" xmlns:p="http://schemas.openxmlformats.org/presentationml/2006/main">
   <p:cSld>
     <p:spTree>

</xml_diff>

<commit_message>
Präsentation für Mittwoch geupdated - Finale Version
</commit_message>
<xml_diff>
--- a/orga/PrasiSNEK.pptx
+++ b/orga/PrasiSNEK.pptx
@@ -9,7 +9,7 @@
     <p:sldId id="257" r:id="rId3"/>
     <p:sldId id="258" r:id="rId4"/>
     <p:sldId id="259" r:id="rId5"/>
-    <p:sldId id="261" r:id="rId6"/>
+    <p:sldId id="262" r:id="rId6"/>
     <p:sldId id="263" r:id="rId7"/>
     <p:sldId id="264" r:id="rId8"/>
   </p:sldIdLst>
@@ -6148,7 +6148,7 @@
         <p:spPr/>
         <p:txBody>
           <a:bodyPr>
-            <a:normAutofit fontScale="92500" lnSpcReduction="20000"/>
+            <a:normAutofit fontScale="92500" lnSpcReduction="10000"/>
           </a:bodyPr>
           <a:lstStyle/>
           <a:p>
@@ -6182,7 +6182,7 @@
             <a:pPr lvl="2"/>
             <a:r>
               <a:rPr lang="de-DE" dirty="0"/>
-              <a:t>Grobes Programmmodell</a:t>
+              <a:t>Grobes Programmmodel</a:t>
             </a:r>
           </a:p>
           <a:p>
@@ -6203,13 +6203,6 @@
             <a:r>
               <a:rPr lang="de-DE" dirty="0"/>
               <a:t>Grobe Aufgabenverteilung</a:t>
-            </a:r>
-          </a:p>
-          <a:p>
-            <a:pPr lvl="1"/>
-            <a:r>
-              <a:rPr lang="de-DE" dirty="0"/>
-              <a:t>Untergruppen</a:t>
             </a:r>
           </a:p>
           <a:p>
@@ -6545,7 +6538,7 @@
           <p:cNvPr id="2" name="Titel 1">
             <a:extLst>
               <a:ext uri="{FF2B5EF4-FFF2-40B4-BE49-F238E27FC236}">
-                <a16:creationId xmlns:a16="http://schemas.microsoft.com/office/drawing/2014/main" id="{9CE08AE9-F318-425C-ABB0-EB3C3A935B3E}"/>
+                <a16:creationId xmlns:a16="http://schemas.microsoft.com/office/drawing/2014/main" id="{BBCF62C3-6BA4-4569-904A-ECC65F4876B0}"/>
               </a:ext>
             </a:extLst>
           </p:cNvPr>
@@ -6571,39 +6564,10 @@
       </p:sp>
       <p:sp>
         <p:nvSpPr>
-          <p:cNvPr id="3" name="Inhaltsplatzhalter 2">
-            <a:extLst>
-              <a:ext uri="{FF2B5EF4-FFF2-40B4-BE49-F238E27FC236}">
-                <a16:creationId xmlns:a16="http://schemas.microsoft.com/office/drawing/2014/main" id="{9C0D44A7-827E-4C30-B10F-D882E1F14ED5}"/>
-              </a:ext>
-            </a:extLst>
-          </p:cNvPr>
-          <p:cNvSpPr>
-            <a:spLocks noGrp="1"/>
-          </p:cNvSpPr>
-          <p:nvPr>
-            <p:ph idx="1"/>
-          </p:nvPr>
-        </p:nvSpPr>
-        <p:spPr/>
-        <p:txBody>
-          <a:bodyPr/>
-          <a:lstStyle/>
-          <a:p>
-            <a:r>
-              <a:rPr lang="de-DE" dirty="0"/>
-              <a:t>Schwerpunktgebiete der einzelnen Mitglieder</a:t>
-            </a:r>
-            <a:endParaRPr lang="en-US" dirty="0"/>
-          </a:p>
-        </p:txBody>
-      </p:sp>
-      <p:sp>
-        <p:nvSpPr>
           <p:cNvPr id="4" name="Textfeld 3">
             <a:extLst>
               <a:ext uri="{FF2B5EF4-FFF2-40B4-BE49-F238E27FC236}">
-                <a16:creationId xmlns:a16="http://schemas.microsoft.com/office/drawing/2014/main" id="{1FFEF346-B14D-4CB8-A528-D95E73C3D74E}"/>
+                <a16:creationId xmlns:a16="http://schemas.microsoft.com/office/drawing/2014/main" id="{00BE8D41-9F6F-4E54-884E-95703134894D}"/>
               </a:ext>
             </a:extLst>
           </p:cNvPr>
@@ -6634,40 +6598,92 @@
           </a:p>
         </p:txBody>
       </p:sp>
-      <p:pic>
-        <p:nvPicPr>
-          <p:cNvPr id="6" name="Grafik 5">
+      <p:sp>
+        <p:nvSpPr>
+          <p:cNvPr id="8" name="Inhaltsplatzhalter 2">
             <a:extLst>
               <a:ext uri="{FF2B5EF4-FFF2-40B4-BE49-F238E27FC236}">
-                <a16:creationId xmlns:a16="http://schemas.microsoft.com/office/drawing/2014/main" id="{5C8C8E98-5A3F-40AC-9965-A4DF1AAB885E}"/>
+                <a16:creationId xmlns:a16="http://schemas.microsoft.com/office/drawing/2014/main" id="{908ECA19-403D-4E29-9117-D136C9A3AC58}"/>
               </a:ext>
             </a:extLst>
           </p:cNvPr>
-          <p:cNvPicPr>
-            <a:picLocks noChangeAspect="1"/>
-          </p:cNvPicPr>
-          <p:nvPr/>
-        </p:nvPicPr>
-        <p:blipFill>
-          <a:blip r:embed="rId2"/>
-          <a:stretch>
-            <a:fillRect/>
-          </a:stretch>
-        </p:blipFill>
+          <p:cNvSpPr>
+            <a:spLocks noGrp="1"/>
+          </p:cNvSpPr>
+          <p:nvPr>
+            <p:ph idx="1"/>
+          </p:nvPr>
+        </p:nvSpPr>
         <p:spPr>
           <a:xfrm>
-            <a:off x="989876" y="3220240"/>
-            <a:ext cx="10098812" cy="2211813"/>
+            <a:off x="1103312" y="2052918"/>
+            <a:ext cx="8946541" cy="4195481"/>
           </a:xfrm>
-          <a:prstGeom prst="rect">
-            <a:avLst/>
-          </a:prstGeom>
         </p:spPr>
-      </p:pic>
+        <p:txBody>
+          <a:bodyPr/>
+          <a:lstStyle/>
+          <a:p>
+            <a:r>
+              <a:rPr lang="de-DE" dirty="0"/>
+              <a:t>Schwerpunktgebiete der einzelnen Mitglieder</a:t>
+            </a:r>
+            <a:br>
+              <a:rPr lang="de-DE" dirty="0"/>
+            </a:br>
+            <a:endParaRPr lang="en-US" dirty="0"/>
+          </a:p>
+          <a:p>
+            <a:pPr lvl="1"/>
+            <a:r>
+              <a:rPr lang="de-DE" dirty="0"/>
+              <a:t>Spielelogik: 			Lisa, Marina, </a:t>
+            </a:r>
+            <a:r>
+              <a:rPr lang="de-DE" dirty="0" err="1"/>
+              <a:t>Lule</a:t>
+            </a:r>
+            <a:r>
+              <a:rPr lang="de-DE" dirty="0"/>
+              <a:t>, Yasmin</a:t>
+            </a:r>
+          </a:p>
+          <a:p>
+            <a:pPr lvl="1"/>
+            <a:r>
+              <a:rPr lang="de-DE" dirty="0"/>
+              <a:t>Canvas-Umsetzung: 	Julian, Marina</a:t>
+            </a:r>
+          </a:p>
+          <a:p>
+            <a:pPr lvl="1"/>
+            <a:r>
+              <a:rPr lang="de-DE" dirty="0"/>
+              <a:t>Website:				Julian</a:t>
+            </a:r>
+          </a:p>
+          <a:p>
+            <a:pPr lvl="1"/>
+            <a:r>
+              <a:rPr lang="de-DE" dirty="0"/>
+              <a:t>Dokumentation:		</a:t>
+            </a:r>
+            <a:r>
+              <a:rPr lang="de-DE" dirty="0" err="1"/>
+              <a:t>Lule</a:t>
+            </a:r>
+            <a:r>
+              <a:rPr lang="de-DE" dirty="0"/>
+              <a:t>, Yasmin</a:t>
+            </a:r>
+            <a:endParaRPr lang="en-US" dirty="0"/>
+          </a:p>
+        </p:txBody>
+      </p:sp>
     </p:spTree>
     <p:extLst>
       <p:ext uri="{BB962C8B-B14F-4D97-AF65-F5344CB8AC3E}">
-        <p14:creationId xmlns:p14="http://schemas.microsoft.com/office/powerpoint/2010/main" val="1055447901"/>
+        <p14:creationId xmlns:p14="http://schemas.microsoft.com/office/powerpoint/2010/main" val="2078511532"/>
       </p:ext>
     </p:extLst>
   </p:cSld>

</xml_diff>

<commit_message>
Präsentation für Mittwoch geupdated - Finale finale Version
</commit_message>
<xml_diff>
--- a/orga/PrasiSNEK.pptx
+++ b/orga/PrasiSNEK.pptx
@@ -6028,7 +6028,12 @@
             <p:ph type="ctrTitle"/>
           </p:nvPr>
         </p:nvSpPr>
-        <p:spPr/>
+        <p:spPr>
+          <a:xfrm>
+            <a:off x="1154588" y="2770893"/>
+            <a:ext cx="8825658" cy="3329581"/>
+          </a:xfrm>
+        </p:spPr>
         <p:txBody>
           <a:bodyPr/>
           <a:lstStyle/>
@@ -6067,6 +6072,571 @@
               <a:t>Organisations-Präsentation</a:t>
             </a:r>
             <a:endParaRPr lang="en-US" dirty="0"/>
+          </a:p>
+        </p:txBody>
+      </p:sp>
+      <p:sp>
+        <p:nvSpPr>
+          <p:cNvPr id="19" name="Rechteck 18">
+            <a:extLst>
+              <a:ext uri="{FF2B5EF4-FFF2-40B4-BE49-F238E27FC236}">
+                <a16:creationId xmlns:a16="http://schemas.microsoft.com/office/drawing/2014/main" id="{8CFDD286-C2C7-4C8E-BCC7-C583CDA245EA}"/>
+              </a:ext>
+            </a:extLst>
+          </p:cNvPr>
+          <p:cNvSpPr/>
+          <p:nvPr/>
+        </p:nvSpPr>
+        <p:spPr>
+          <a:xfrm>
+            <a:off x="3499343" y="1290464"/>
+            <a:ext cx="4320481" cy="2797279"/>
+          </a:xfrm>
+          <a:prstGeom prst="rect">
+            <a:avLst/>
+          </a:prstGeom>
+          <a:solidFill>
+            <a:schemeClr val="tx1"/>
+          </a:solidFill>
+          <a:ln>
+            <a:solidFill>
+              <a:schemeClr val="tx1"/>
+            </a:solidFill>
+          </a:ln>
+          <a:effectLst/>
+        </p:spPr>
+        <p:style>
+          <a:lnRef idx="2">
+            <a:schemeClr val="accent1">
+              <a:shade val="50000"/>
+            </a:schemeClr>
+          </a:lnRef>
+          <a:fillRef idx="1">
+            <a:schemeClr val="accent1"/>
+          </a:fillRef>
+          <a:effectRef idx="0">
+            <a:schemeClr val="accent1"/>
+          </a:effectRef>
+          <a:fontRef idx="minor">
+            <a:schemeClr val="lt1"/>
+          </a:fontRef>
+        </p:style>
+        <p:txBody>
+          <a:bodyPr rtlCol="0" anchor="ctr"/>
+          <a:lstStyle/>
+          <a:p>
+            <a:pPr algn="ctr"/>
+            <a:endParaRPr lang="de-DE"/>
+          </a:p>
+        </p:txBody>
+      </p:sp>
+      <p:sp>
+        <p:nvSpPr>
+          <p:cNvPr id="20" name="Rechteck 19">
+            <a:extLst>
+              <a:ext uri="{FF2B5EF4-FFF2-40B4-BE49-F238E27FC236}">
+                <a16:creationId xmlns:a16="http://schemas.microsoft.com/office/drawing/2014/main" id="{15302534-4A6E-4325-93A1-825D5F9CCECA}"/>
+              </a:ext>
+            </a:extLst>
+          </p:cNvPr>
+          <p:cNvSpPr/>
+          <p:nvPr/>
+        </p:nvSpPr>
+        <p:spPr>
+          <a:xfrm>
+            <a:off x="3499710" y="3810744"/>
+            <a:ext cx="4320480" cy="288032"/>
+          </a:xfrm>
+          <a:prstGeom prst="rect">
+            <a:avLst/>
+          </a:prstGeom>
+          <a:solidFill>
+            <a:schemeClr val="bg1">
+              <a:lumMod val="50000"/>
+              <a:lumOff val="50000"/>
+            </a:schemeClr>
+          </a:solidFill>
+          <a:ln>
+            <a:noFill/>
+          </a:ln>
+        </p:spPr>
+        <p:style>
+          <a:lnRef idx="2">
+            <a:schemeClr val="accent1">
+              <a:shade val="50000"/>
+            </a:schemeClr>
+          </a:lnRef>
+          <a:fillRef idx="1">
+            <a:schemeClr val="accent1"/>
+          </a:fillRef>
+          <a:effectRef idx="0">
+            <a:schemeClr val="accent1"/>
+          </a:effectRef>
+          <a:fontRef idx="minor">
+            <a:schemeClr val="lt1"/>
+          </a:fontRef>
+        </p:style>
+        <p:txBody>
+          <a:bodyPr rtlCol="0" anchor="ctr"/>
+          <a:lstStyle/>
+          <a:p>
+            <a:pPr algn="ctr"/>
+            <a:endParaRPr lang="de-DE"/>
+          </a:p>
+        </p:txBody>
+      </p:sp>
+      <p:sp>
+        <p:nvSpPr>
+          <p:cNvPr id="21" name="Rechteck 20">
+            <a:extLst>
+              <a:ext uri="{FF2B5EF4-FFF2-40B4-BE49-F238E27FC236}">
+                <a16:creationId xmlns:a16="http://schemas.microsoft.com/office/drawing/2014/main" id="{C04CBAC4-BC18-4D43-BB98-D0AC2C1E7E80}"/>
+              </a:ext>
+            </a:extLst>
+          </p:cNvPr>
+          <p:cNvSpPr/>
+          <p:nvPr/>
+        </p:nvSpPr>
+        <p:spPr>
+          <a:xfrm>
+            <a:off x="3499710" y="1290464"/>
+            <a:ext cx="4320480" cy="2808312"/>
+          </a:xfrm>
+          <a:prstGeom prst="rect">
+            <a:avLst/>
+          </a:prstGeom>
+          <a:noFill/>
+          <a:ln w="38100">
+            <a:solidFill>
+              <a:schemeClr val="tx1"/>
+            </a:solidFill>
+          </a:ln>
+        </p:spPr>
+        <p:style>
+          <a:lnRef idx="2">
+            <a:schemeClr val="accent1">
+              <a:shade val="50000"/>
+            </a:schemeClr>
+          </a:lnRef>
+          <a:fillRef idx="1">
+            <a:schemeClr val="accent1"/>
+          </a:fillRef>
+          <a:effectRef idx="0">
+            <a:schemeClr val="accent1"/>
+          </a:effectRef>
+          <a:fontRef idx="minor">
+            <a:schemeClr val="lt1"/>
+          </a:fontRef>
+        </p:style>
+        <p:txBody>
+          <a:bodyPr rtlCol="0" anchor="ctr"/>
+          <a:lstStyle/>
+          <a:p>
+            <a:pPr algn="ctr"/>
+            <a:endParaRPr lang="de-DE"/>
+          </a:p>
+        </p:txBody>
+      </p:sp>
+      <p:sp>
+        <p:nvSpPr>
+          <p:cNvPr id="22" name="Rechteck 21">
+            <a:extLst>
+              <a:ext uri="{FF2B5EF4-FFF2-40B4-BE49-F238E27FC236}">
+                <a16:creationId xmlns:a16="http://schemas.microsoft.com/office/drawing/2014/main" id="{B0383207-933E-42B0-BE0D-7EE60A59E854}"/>
+              </a:ext>
+            </a:extLst>
+          </p:cNvPr>
+          <p:cNvSpPr/>
+          <p:nvPr/>
+        </p:nvSpPr>
+        <p:spPr>
+          <a:xfrm>
+            <a:off x="4723846" y="2336666"/>
+            <a:ext cx="1800200" cy="72008"/>
+          </a:xfrm>
+          <a:prstGeom prst="rect">
+            <a:avLst/>
+          </a:prstGeom>
+          <a:solidFill>
+            <a:srgbClr val="00B050"/>
+          </a:solidFill>
+          <a:ln>
+            <a:noFill/>
+          </a:ln>
+        </p:spPr>
+        <p:style>
+          <a:lnRef idx="2">
+            <a:schemeClr val="accent1">
+              <a:shade val="50000"/>
+            </a:schemeClr>
+          </a:lnRef>
+          <a:fillRef idx="1">
+            <a:schemeClr val="accent1"/>
+          </a:fillRef>
+          <a:effectRef idx="0">
+            <a:schemeClr val="accent1"/>
+          </a:effectRef>
+          <a:fontRef idx="minor">
+            <a:schemeClr val="lt1"/>
+          </a:fontRef>
+        </p:style>
+        <p:txBody>
+          <a:bodyPr rtlCol="0" anchor="ctr"/>
+          <a:lstStyle/>
+          <a:p>
+            <a:pPr algn="ctr"/>
+            <a:endParaRPr lang="de-DE"/>
+          </a:p>
+        </p:txBody>
+      </p:sp>
+      <p:sp>
+        <p:nvSpPr>
+          <p:cNvPr id="23" name="Rechteck 22">
+            <a:extLst>
+              <a:ext uri="{FF2B5EF4-FFF2-40B4-BE49-F238E27FC236}">
+                <a16:creationId xmlns:a16="http://schemas.microsoft.com/office/drawing/2014/main" id="{96088992-435D-4A2A-85BE-D8FB3DE9BD8F}"/>
+              </a:ext>
+            </a:extLst>
+          </p:cNvPr>
+          <p:cNvSpPr/>
+          <p:nvPr/>
+        </p:nvSpPr>
+        <p:spPr>
+          <a:xfrm rot="5400000">
+            <a:off x="4453850" y="2642666"/>
+            <a:ext cx="612000" cy="72008"/>
+          </a:xfrm>
+          <a:prstGeom prst="rect">
+            <a:avLst/>
+          </a:prstGeom>
+          <a:solidFill>
+            <a:srgbClr val="00B050"/>
+          </a:solidFill>
+          <a:ln>
+            <a:noFill/>
+          </a:ln>
+        </p:spPr>
+        <p:style>
+          <a:lnRef idx="2">
+            <a:schemeClr val="accent1">
+              <a:shade val="50000"/>
+            </a:schemeClr>
+          </a:lnRef>
+          <a:fillRef idx="1">
+            <a:schemeClr val="accent1"/>
+          </a:fillRef>
+          <a:effectRef idx="0">
+            <a:schemeClr val="accent1"/>
+          </a:effectRef>
+          <a:fontRef idx="minor">
+            <a:schemeClr val="lt1"/>
+          </a:fontRef>
+        </p:style>
+        <p:txBody>
+          <a:bodyPr rtlCol="0" anchor="ctr"/>
+          <a:lstStyle/>
+          <a:p>
+            <a:pPr algn="ctr"/>
+            <a:endParaRPr lang="de-DE"/>
+          </a:p>
+        </p:txBody>
+      </p:sp>
+      <p:sp>
+        <p:nvSpPr>
+          <p:cNvPr id="24" name="Ellipse 23">
+            <a:extLst>
+              <a:ext uri="{FF2B5EF4-FFF2-40B4-BE49-F238E27FC236}">
+                <a16:creationId xmlns:a16="http://schemas.microsoft.com/office/drawing/2014/main" id="{979E604F-B9E5-42AC-94E3-F0068BFD3773}"/>
+              </a:ext>
+            </a:extLst>
+          </p:cNvPr>
+          <p:cNvSpPr/>
+          <p:nvPr/>
+        </p:nvSpPr>
+        <p:spPr>
+          <a:xfrm>
+            <a:off x="4703968" y="2891565"/>
+            <a:ext cx="45719" cy="45719"/>
+          </a:xfrm>
+          <a:prstGeom prst="ellipse">
+            <a:avLst/>
+          </a:prstGeom>
+          <a:ln w="19050"/>
+        </p:spPr>
+        <p:style>
+          <a:lnRef idx="2">
+            <a:schemeClr val="dk1"/>
+          </a:lnRef>
+          <a:fillRef idx="1">
+            <a:schemeClr val="lt1"/>
+          </a:fillRef>
+          <a:effectRef idx="0">
+            <a:schemeClr val="dk1"/>
+          </a:effectRef>
+          <a:fontRef idx="minor">
+            <a:schemeClr val="dk1"/>
+          </a:fontRef>
+        </p:style>
+        <p:txBody>
+          <a:bodyPr rtlCol="0" anchor="ctr"/>
+          <a:lstStyle/>
+          <a:p>
+            <a:pPr algn="ctr"/>
+            <a:endParaRPr lang="de-DE"/>
+          </a:p>
+        </p:txBody>
+      </p:sp>
+      <p:sp>
+        <p:nvSpPr>
+          <p:cNvPr id="25" name="Ellipse 24">
+            <a:extLst>
+              <a:ext uri="{FF2B5EF4-FFF2-40B4-BE49-F238E27FC236}">
+                <a16:creationId xmlns:a16="http://schemas.microsoft.com/office/drawing/2014/main" id="{216092DD-7776-4C78-A3D8-62024A95BD4A}"/>
+              </a:ext>
+            </a:extLst>
+          </p:cNvPr>
+          <p:cNvSpPr/>
+          <p:nvPr/>
+        </p:nvSpPr>
+        <p:spPr>
+          <a:xfrm>
+            <a:off x="4771164" y="2891565"/>
+            <a:ext cx="45719" cy="45719"/>
+          </a:xfrm>
+          <a:prstGeom prst="ellipse">
+            <a:avLst/>
+          </a:prstGeom>
+          <a:ln w="19050"/>
+        </p:spPr>
+        <p:style>
+          <a:lnRef idx="2">
+            <a:schemeClr val="dk1"/>
+          </a:lnRef>
+          <a:fillRef idx="1">
+            <a:schemeClr val="lt1"/>
+          </a:fillRef>
+          <a:effectRef idx="0">
+            <a:schemeClr val="dk1"/>
+          </a:effectRef>
+          <a:fontRef idx="minor">
+            <a:schemeClr val="dk1"/>
+          </a:fontRef>
+        </p:style>
+        <p:txBody>
+          <a:bodyPr rtlCol="0" anchor="ctr"/>
+          <a:lstStyle/>
+          <a:p>
+            <a:pPr algn="ctr"/>
+            <a:endParaRPr lang="de-DE"/>
+          </a:p>
+        </p:txBody>
+      </p:sp>
+      <p:cxnSp>
+        <p:nvCxnSpPr>
+          <p:cNvPr id="26" name="Gerader Verbinder 25">
+            <a:extLst>
+              <a:ext uri="{FF2B5EF4-FFF2-40B4-BE49-F238E27FC236}">
+                <a16:creationId xmlns:a16="http://schemas.microsoft.com/office/drawing/2014/main" id="{38FD5510-9170-491D-87B3-567F79174950}"/>
+              </a:ext>
+            </a:extLst>
+          </p:cNvPr>
+          <p:cNvCxnSpPr>
+            <a:cxnSpLocks/>
+          </p:cNvCxnSpPr>
+          <p:nvPr/>
+        </p:nvCxnSpPr>
+        <p:spPr>
+          <a:xfrm>
+            <a:off x="4739976" y="2965648"/>
+            <a:ext cx="36000" cy="0"/>
+          </a:xfrm>
+          <a:prstGeom prst="line">
+            <a:avLst/>
+          </a:prstGeom>
+        </p:spPr>
+        <p:style>
+          <a:lnRef idx="1">
+            <a:schemeClr val="dk1"/>
+          </a:lnRef>
+          <a:fillRef idx="0">
+            <a:schemeClr val="dk1"/>
+          </a:fillRef>
+          <a:effectRef idx="0">
+            <a:schemeClr val="dk1"/>
+          </a:effectRef>
+          <a:fontRef idx="minor">
+            <a:schemeClr val="tx1"/>
+          </a:fontRef>
+        </p:style>
+      </p:cxnSp>
+      <p:sp>
+        <p:nvSpPr>
+          <p:cNvPr id="27" name="Ellipse 26">
+            <a:extLst>
+              <a:ext uri="{FF2B5EF4-FFF2-40B4-BE49-F238E27FC236}">
+                <a16:creationId xmlns:a16="http://schemas.microsoft.com/office/drawing/2014/main" id="{F4D4E2B2-DB21-48F8-B234-4105B62505B0}"/>
+              </a:ext>
+            </a:extLst>
+          </p:cNvPr>
+          <p:cNvSpPr/>
+          <p:nvPr/>
+        </p:nvSpPr>
+        <p:spPr>
+          <a:xfrm>
+            <a:off x="4710542" y="3213188"/>
+            <a:ext cx="94867" cy="94867"/>
+          </a:xfrm>
+          <a:prstGeom prst="ellipse">
+            <a:avLst/>
+          </a:prstGeom>
+          <a:ln>
+            <a:noFill/>
+          </a:ln>
+        </p:spPr>
+        <p:style>
+          <a:lnRef idx="2">
+            <a:schemeClr val="accent2">
+              <a:shade val="50000"/>
+            </a:schemeClr>
+          </a:lnRef>
+          <a:fillRef idx="1">
+            <a:schemeClr val="accent2"/>
+          </a:fillRef>
+          <a:effectRef idx="0">
+            <a:schemeClr val="accent2"/>
+          </a:effectRef>
+          <a:fontRef idx="minor">
+            <a:schemeClr val="lt1"/>
+          </a:fontRef>
+        </p:style>
+        <p:txBody>
+          <a:bodyPr rtlCol="0" anchor="ctr"/>
+          <a:lstStyle/>
+          <a:p>
+            <a:pPr algn="ctr"/>
+            <a:endParaRPr lang="de-DE"/>
+          </a:p>
+        </p:txBody>
+      </p:sp>
+      <p:cxnSp>
+        <p:nvCxnSpPr>
+          <p:cNvPr id="28" name="Gerader Verbinder 27">
+            <a:extLst>
+              <a:ext uri="{FF2B5EF4-FFF2-40B4-BE49-F238E27FC236}">
+                <a16:creationId xmlns:a16="http://schemas.microsoft.com/office/drawing/2014/main" id="{1444D8BA-911F-4783-9A79-43E23C0EAC15}"/>
+              </a:ext>
+            </a:extLst>
+          </p:cNvPr>
+          <p:cNvCxnSpPr/>
+          <p:nvPr/>
+        </p:nvCxnSpPr>
+        <p:spPr>
+          <a:xfrm>
+            <a:off x="3499710" y="3810744"/>
+            <a:ext cx="4320480" cy="0"/>
+          </a:xfrm>
+          <a:prstGeom prst="line">
+            <a:avLst/>
+          </a:prstGeom>
+        </p:spPr>
+        <p:style>
+          <a:lnRef idx="1">
+            <a:schemeClr val="dk1"/>
+          </a:lnRef>
+          <a:fillRef idx="0">
+            <a:schemeClr val="dk1"/>
+          </a:fillRef>
+          <a:effectRef idx="0">
+            <a:schemeClr val="dk1"/>
+          </a:effectRef>
+          <a:fontRef idx="minor">
+            <a:schemeClr val="tx1"/>
+          </a:fontRef>
+        </p:style>
+      </p:cxnSp>
+      <p:sp>
+        <p:nvSpPr>
+          <p:cNvPr id="29" name="Textfeld 28">
+            <a:extLst>
+              <a:ext uri="{FF2B5EF4-FFF2-40B4-BE49-F238E27FC236}">
+                <a16:creationId xmlns:a16="http://schemas.microsoft.com/office/drawing/2014/main" id="{03A38313-36F5-47BF-8671-1B1DB00FF77F}"/>
+              </a:ext>
+            </a:extLst>
+          </p:cNvPr>
+          <p:cNvSpPr txBox="1"/>
+          <p:nvPr/>
+        </p:nvSpPr>
+        <p:spPr>
+          <a:xfrm>
+            <a:off x="3499710" y="3810744"/>
+            <a:ext cx="1271454" cy="276999"/>
+          </a:xfrm>
+          <a:prstGeom prst="rect">
+            <a:avLst/>
+          </a:prstGeom>
+          <a:noFill/>
+        </p:spPr>
+        <p:txBody>
+          <a:bodyPr wrap="square" rtlCol="0">
+            <a:spAutoFit/>
+          </a:bodyPr>
+          <a:lstStyle/>
+          <a:p>
+            <a:r>
+              <a:rPr lang="de-DE" sz="1200" b="1" dirty="0"/>
+              <a:t>SCORE: 42</a:t>
+            </a:r>
+          </a:p>
+        </p:txBody>
+      </p:sp>
+      <p:sp>
+        <p:nvSpPr>
+          <p:cNvPr id="30" name="Gleich 29">
+            <a:extLst>
+              <a:ext uri="{FF2B5EF4-FFF2-40B4-BE49-F238E27FC236}">
+                <a16:creationId xmlns:a16="http://schemas.microsoft.com/office/drawing/2014/main" id="{6C71B00A-0F64-4009-8225-8770FF9AC23E}"/>
+              </a:ext>
+            </a:extLst>
+          </p:cNvPr>
+          <p:cNvSpPr/>
+          <p:nvPr/>
+        </p:nvSpPr>
+        <p:spPr>
+          <a:xfrm rot="5400000">
+            <a:off x="7576408" y="3841977"/>
+            <a:ext cx="154212" cy="195487"/>
+          </a:xfrm>
+          <a:prstGeom prst="mathEqual">
+            <a:avLst/>
+          </a:prstGeom>
+          <a:ln w="3175"/>
+        </p:spPr>
+        <p:style>
+          <a:lnRef idx="2">
+            <a:schemeClr val="dk1">
+              <a:shade val="50000"/>
+            </a:schemeClr>
+          </a:lnRef>
+          <a:fillRef idx="1">
+            <a:schemeClr val="dk1"/>
+          </a:fillRef>
+          <a:effectRef idx="0">
+            <a:schemeClr val="dk1"/>
+          </a:effectRef>
+          <a:fontRef idx="minor">
+            <a:schemeClr val="lt1"/>
+          </a:fontRef>
+        </p:style>
+        <p:txBody>
+          <a:bodyPr rtlCol="0" anchor="ctr"/>
+          <a:lstStyle/>
+          <a:p>
+            <a:pPr algn="ctr"/>
+            <a:endParaRPr lang="de-DE">
+              <a:solidFill>
+                <a:schemeClr val="tx1"/>
+              </a:solidFill>
+            </a:endParaRPr>
           </a:p>
         </p:txBody>
       </p:sp>

</xml_diff>